<commit_message>
esto es de prueba II TRIMESTRE
esto es de prueba II TRIMESTRE
</commit_message>
<xml_diff>
--- a/II trimestre/exposicion.pptx
+++ b/II trimestre/exposicion.pptx
@@ -8622,7 +8622,28 @@
                 <a:cs typeface="Calibri"/>
                 <a:sym typeface="Calibri"/>
               </a:rPr>
-              <a:t>ANDRES FELIPE QUIROGA OSORIO</a:t>
+              <a:t>ANDRES FELIPE QUIROGA OSORIO </a:t>
+            </a:r>
+          </a:p>
+          <a:p>
+            <a:pPr marL="0" marR="0" lvl="0" indent="0" algn="ctr" rtl="0">
+              <a:spcBef>
+                <a:spcPts val="0"/>
+              </a:spcBef>
+              <a:buSzPct val="25000"/>
+              <a:buNone/>
+            </a:pPr>
+            <a:r>
+              <a:rPr lang="es-ES" sz="1800" b="1" dirty="0">
+                <a:solidFill>
+                  <a:srgbClr val="ACC42D"/>
+                </a:solidFill>
+                <a:latin typeface="Calibri"/>
+                <a:ea typeface="Calibri"/>
+                <a:cs typeface="Calibri"/>
+                <a:sym typeface="Calibri"/>
+              </a:rPr>
+              <a:t>LUSI GABRIEL RAMIREZ MOLINA</a:t>
             </a:r>
           </a:p>
           <a:p>

</xml_diff>